<commit_message>
added few more commands
</commit_message>
<xml_diff>
--- a/Git Commands.pptx
+++ b/Git Commands.pptx
@@ -7,6 +7,7 @@
   <p:sldIdLst>
     <p:sldId id="256" r:id="rId2"/>
     <p:sldId id="257" r:id="rId3"/>
+    <p:sldId id="258" r:id="rId4"/>
   </p:sldIdLst>
   <p:sldSz cx="12192000" cy="6858000"/>
   <p:notesSz cx="6858000" cy="9144000"/>
@@ -3765,7 +3766,7 @@
             <a:pPr lvl="2" algn="l"/>
             <a:r>
               <a:rPr lang="en-US" dirty="0"/>
-              <a:t>First clone you repo </a:t>
+              <a:t>First clone you repo and then add the file</a:t>
             </a:r>
           </a:p>
           <a:p>
@@ -3776,7 +3777,7 @@
                   <a:srgbClr val="C00000"/>
                 </a:solidFill>
               </a:rPr>
-              <a:t>git add "C:\Users\Hemappa\Documents\Buckeye_StreamTV\Git Commands.pptx"</a:t>
+              <a:t>$git add “Git Commands.pptx"</a:t>
             </a:r>
           </a:p>
           <a:p>
@@ -3784,13 +3785,82 @@
               <a:buFont typeface="Arial" panose="020B0604020202020204" pitchFamily="34" charset="0"/>
               <a:buChar char="•"/>
             </a:pPr>
-            <a:endParaRPr lang="en-US" dirty="0"/>
-          </a:p>
-          <a:p>
-            <a:pPr marL="342900" indent="-342900" algn="l">
+            <a:r>
+              <a:rPr lang="en-US" dirty="0"/>
+              <a:t>Commit the changes </a:t>
+            </a:r>
+          </a:p>
+          <a:p>
+            <a:pPr lvl="1" algn="l"/>
+            <a:r>
+              <a:rPr lang="en-IN" dirty="0"/>
+              <a:t>       $git commit -m "Initial check in" "Git Commands.pptx" </a:t>
+            </a:r>
+          </a:p>
+          <a:p>
+            <a:pPr marL="800100" lvl="1" indent="-342900" algn="l">
               <a:buFont typeface="Arial" panose="020B0604020202020204" pitchFamily="34" charset="0"/>
               <a:buChar char="•"/>
             </a:pPr>
+            <a:r>
+              <a:rPr lang="en-IN" dirty="0"/>
+              <a:t>Push your local changes into remote server </a:t>
+            </a:r>
+          </a:p>
+          <a:p>
+            <a:pPr lvl="1" algn="l"/>
+            <a:r>
+              <a:rPr lang="en-US" dirty="0"/>
+              <a:t>      First find the remote server </a:t>
+            </a:r>
+            <a:r>
+              <a:rPr lang="en-US" dirty="0" err="1"/>
+              <a:t>url</a:t>
+            </a:r>
+            <a:endParaRPr lang="en-US" dirty="0"/>
+          </a:p>
+          <a:p>
+            <a:pPr lvl="1" algn="l"/>
+            <a:r>
+              <a:rPr lang="en-US" dirty="0"/>
+              <a:t>      $git remote -v</a:t>
+            </a:r>
+          </a:p>
+          <a:p>
+            <a:pPr lvl="1" algn="l"/>
+            <a:r>
+              <a:rPr lang="en-US" dirty="0"/>
+              <a:t> 	o</a:t>
+            </a:r>
+            <a:r>
+              <a:rPr lang="en-IN" dirty="0" err="1"/>
+              <a:t>rigin</a:t>
+            </a:r>
+            <a:r>
+              <a:rPr lang="en-IN" dirty="0"/>
+              <a:t>  https://github.com/hemappab/docs.git (fetch)</a:t>
+            </a:r>
+          </a:p>
+          <a:p>
+            <a:pPr lvl="1" algn="l"/>
+            <a:r>
+              <a:rPr lang="en-IN" dirty="0"/>
+              <a:t> 	origin  https://github.com/hemappab/docs.git (push)</a:t>
+            </a:r>
+          </a:p>
+          <a:p>
+            <a:pPr lvl="1" algn="l"/>
+            <a:r>
+              <a:rPr lang="en-IN" dirty="0"/>
+              <a:t>      $git push origin master      </a:t>
+            </a:r>
+          </a:p>
+          <a:p>
+            <a:pPr lvl="1" algn="l"/>
+            <a:r>
+              <a:rPr lang="en-IN" dirty="0"/>
+              <a:t>       Note : Master is your branch now , otherwise you need give your branch name. I will show you how to create the branch</a:t>
+            </a:r>
             <a:endParaRPr lang="en-US" dirty="0"/>
           </a:p>
         </p:txBody>
@@ -3799,6 +3869,182 @@
     <p:extLst>
       <p:ext uri="{BB962C8B-B14F-4D97-AF65-F5344CB8AC3E}">
         <p14:creationId xmlns:p14="http://schemas.microsoft.com/office/powerpoint/2010/main" val="2667546830"/>
+      </p:ext>
+    </p:extLst>
+  </p:cSld>
+  <p:clrMapOvr>
+    <a:masterClrMapping/>
+  </p:clrMapOvr>
+</p:sld>
+</file>
+
+<file path=ppt/slides/slide3.xml><?xml version="1.0" encoding="utf-8"?>
+<p:sld xmlns:a="http://schemas.openxmlformats.org/drawingml/2006/main" xmlns:r="http://schemas.openxmlformats.org/officeDocument/2006/relationships" xmlns:p="http://schemas.openxmlformats.org/presentationml/2006/main">
+  <p:cSld>
+    <p:spTree>
+      <p:nvGrpSpPr>
+        <p:cNvPr id="1" name=""/>
+        <p:cNvGrpSpPr/>
+        <p:nvPr/>
+      </p:nvGrpSpPr>
+      <p:grpSpPr>
+        <a:xfrm>
+          <a:off x="0" y="0"/>
+          <a:ext cx="0" cy="0"/>
+          <a:chOff x="0" y="0"/>
+          <a:chExt cx="0" cy="0"/>
+        </a:xfrm>
+      </p:grpSpPr>
+      <p:sp>
+        <p:nvSpPr>
+          <p:cNvPr id="2" name="Title 1">
+            <a:extLst>
+              <a:ext uri="{FF2B5EF4-FFF2-40B4-BE49-F238E27FC236}">
+                <a16:creationId xmlns:a16="http://schemas.microsoft.com/office/drawing/2014/main" id="{FD1D6692-BAFC-467F-8132-79C60BB694A2}"/>
+              </a:ext>
+            </a:extLst>
+          </p:cNvPr>
+          <p:cNvSpPr>
+            <a:spLocks noGrp="1"/>
+          </p:cNvSpPr>
+          <p:nvPr>
+            <p:ph type="ctrTitle"/>
+          </p:nvPr>
+        </p:nvSpPr>
+        <p:spPr>
+          <a:xfrm>
+            <a:off x="1524000" y="391889"/>
+            <a:ext cx="9144000" cy="1161143"/>
+          </a:xfrm>
+        </p:spPr>
+        <p:txBody>
+          <a:bodyPr>
+            <a:normAutofit fontScale="90000"/>
+          </a:bodyPr>
+          <a:lstStyle/>
+          <a:p>
+            <a:r>
+              <a:rPr lang="en-IN" b="1" dirty="0">
+                <a:solidFill>
+                  <a:srgbClr val="00B0F0"/>
+                </a:solidFill>
+              </a:rPr>
+              <a:t>How to create a branch</a:t>
+            </a:r>
+            <a:br>
+              <a:rPr lang="en-IN" dirty="0"/>
+            </a:br>
+            <a:endParaRPr lang="en-IN" sz="2000" dirty="0"/>
+          </a:p>
+        </p:txBody>
+      </p:sp>
+      <p:sp>
+        <p:nvSpPr>
+          <p:cNvPr id="3" name="Subtitle 2">
+            <a:extLst>
+              <a:ext uri="{FF2B5EF4-FFF2-40B4-BE49-F238E27FC236}">
+                <a16:creationId xmlns:a16="http://schemas.microsoft.com/office/drawing/2014/main" id="{69B2CAD2-2989-4882-9BA3-038C7C457D70}"/>
+              </a:ext>
+            </a:extLst>
+          </p:cNvPr>
+          <p:cNvSpPr>
+            <a:spLocks noGrp="1"/>
+          </p:cNvSpPr>
+          <p:nvPr>
+            <p:ph type="subTitle" idx="1"/>
+          </p:nvPr>
+        </p:nvSpPr>
+        <p:spPr>
+          <a:xfrm>
+            <a:off x="333829" y="1669143"/>
+            <a:ext cx="11480799" cy="5188857"/>
+          </a:xfrm>
+        </p:spPr>
+        <p:txBody>
+          <a:bodyPr>
+            <a:normAutofit/>
+          </a:bodyPr>
+          <a:lstStyle/>
+          <a:p>
+            <a:pPr lvl="2" algn="l"/>
+            <a:r>
+              <a:rPr lang="en-US" dirty="0"/>
+              <a:t>Create a new branch to work </a:t>
+            </a:r>
+          </a:p>
+          <a:p>
+            <a:pPr lvl="2" algn="l"/>
+            <a:r>
+              <a:rPr lang="en-US" dirty="0"/>
+              <a:t>$git checkout –b release2.0 master</a:t>
+            </a:r>
+          </a:p>
+          <a:p>
+            <a:pPr lvl="2" algn="l"/>
+            <a:r>
+              <a:rPr lang="en-US" dirty="0"/>
+              <a:t>$git checkout -b release2.0 master</a:t>
+            </a:r>
+          </a:p>
+          <a:p>
+            <a:pPr lvl="2" algn="l"/>
+            <a:r>
+              <a:rPr lang="en-US" dirty="0"/>
+              <a:t>Switched to a new branch 'release2.0’</a:t>
+            </a:r>
+          </a:p>
+          <a:p>
+            <a:pPr lvl="2" algn="l"/>
+            <a:endParaRPr lang="en-US" dirty="0"/>
+          </a:p>
+          <a:p>
+            <a:pPr lvl="2" algn="l"/>
+            <a:r>
+              <a:rPr lang="en-US" dirty="0"/>
+              <a:t>$git branch –a</a:t>
+            </a:r>
+          </a:p>
+          <a:p>
+            <a:pPr lvl="2" algn="l"/>
+            <a:r>
+              <a:rPr lang="en-US" dirty="0"/>
+              <a:t>master </a:t>
+            </a:r>
+          </a:p>
+          <a:p>
+            <a:pPr lvl="2" algn="l"/>
+            <a:r>
+              <a:rPr lang="en-US" dirty="0"/>
+              <a:t>*release2.0 </a:t>
+            </a:r>
+          </a:p>
+          <a:p>
+            <a:pPr lvl="2" algn="l"/>
+            <a:r>
+              <a:rPr lang="en-US" dirty="0"/>
+              <a:t>remotes/origin/HEAD -&gt; origin/master     </a:t>
+            </a:r>
+          </a:p>
+          <a:p>
+            <a:pPr lvl="2" algn="l"/>
+            <a:r>
+              <a:rPr lang="en-US" dirty="0"/>
+              <a:t>remotes/origin/master </a:t>
+            </a:r>
+          </a:p>
+          <a:p>
+            <a:pPr lvl="2" algn="l"/>
+            <a:r>
+              <a:rPr lang="en-US" dirty="0"/>
+              <a:t>Now you are in the branch ‘release2.0’</a:t>
+            </a:r>
+          </a:p>
+        </p:txBody>
+      </p:sp>
+    </p:spTree>
+    <p:extLst>
+      <p:ext uri="{BB962C8B-B14F-4D97-AF65-F5344CB8AC3E}">
+        <p14:creationId xmlns:p14="http://schemas.microsoft.com/office/powerpoint/2010/main" val="4148742185"/>
       </p:ext>
     </p:extLst>
   </p:cSld>

</xml_diff>